<commit_message>
Logs and Ipq/LV eval
</commit_message>
<xml_diff>
--- a/status-reports/20200205/predicting_avatar_movements.pptx
+++ b/status-reports/20200205/predicting_avatar_movements.pptx
@@ -5,15 +5,14 @@
     <p:sldMasterId id="2147483648" r:id="rId1"/>
   </p:sldMasterIdLst>
   <p:notesMasterIdLst>
-    <p:notesMasterId r:id="rId8"/>
+    <p:notesMasterId r:id="rId7"/>
   </p:notesMasterIdLst>
   <p:sldIdLst>
     <p:sldId id="259" r:id="rId2"/>
     <p:sldId id="261" r:id="rId3"/>
     <p:sldId id="264" r:id="rId4"/>
     <p:sldId id="268" r:id="rId5"/>
-    <p:sldId id="265" r:id="rId6"/>
-    <p:sldId id="267" r:id="rId7"/>
+    <p:sldId id="267" r:id="rId6"/>
   </p:sldIdLst>
   <p:sldSz cx="9144000" cy="6858000" type="screen4x3"/>
   <p:notesSz cx="6858000" cy="9144000"/>
@@ -121,7 +120,6 @@
             <p14:sldId id="261"/>
             <p14:sldId id="264"/>
             <p14:sldId id="268"/>
-            <p14:sldId id="265"/>
             <p14:sldId id="267"/>
           </p14:sldIdLst>
         </p14:section>
@@ -8313,7 +8311,7 @@
             <a:fld id="{7AACB081-BB2C-4B4A-9109-5280E0143A04}" type="datetimeFigureOut">
               <a:rPr lang="de-DE" smtClean="0"/>
               <a:pPr/>
-              <a:t>03.02.2020</a:t>
+              <a:t>04.02.2020</a:t>
             </a:fld>
             <a:endParaRPr lang="de-DE"/>
           </a:p>
@@ -9010,91 +9008,6 @@
     </p:spTree>
     <p:extLst>
       <p:ext uri="{BB962C8B-B14F-4D97-AF65-F5344CB8AC3E}">
-        <p14:creationId xmlns:p14="http://schemas.microsoft.com/office/powerpoint/2010/main" val="475075930"/>
-      </p:ext>
-    </p:extLst>
-  </p:cSld>
-  <p:clrMapOvr>
-    <a:masterClrMapping/>
-  </p:clrMapOvr>
-</p:notes>
-</file>
-
-<file path=ppt/notesSlides/notesSlide6.xml><?xml version="1.0" encoding="utf-8"?>
-<p:notes xmlns:a="http://schemas.openxmlformats.org/drawingml/2006/main" xmlns:r="http://schemas.openxmlformats.org/officeDocument/2006/relationships" xmlns:p="http://schemas.openxmlformats.org/presentationml/2006/main">
-  <p:cSld>
-    <p:spTree>
-      <p:nvGrpSpPr>
-        <p:cNvPr id="1" name=""/>
-        <p:cNvGrpSpPr/>
-        <p:nvPr/>
-      </p:nvGrpSpPr>
-      <p:grpSpPr>
-        <a:xfrm>
-          <a:off x="0" y="0"/>
-          <a:ext cx="0" cy="0"/>
-          <a:chOff x="0" y="0"/>
-          <a:chExt cx="0" cy="0"/>
-        </a:xfrm>
-      </p:grpSpPr>
-      <p:sp>
-        <p:nvSpPr>
-          <p:cNvPr id="2" name="Slide Image Placeholder 1"/>
-          <p:cNvSpPr>
-            <a:spLocks noGrp="1" noRot="1" noChangeAspect="1"/>
-          </p:cNvSpPr>
-          <p:nvPr>
-            <p:ph type="sldImg"/>
-          </p:nvPr>
-        </p:nvSpPr>
-        <p:spPr/>
-      </p:sp>
-      <p:sp>
-        <p:nvSpPr>
-          <p:cNvPr id="3" name="Notes Placeholder 2"/>
-          <p:cNvSpPr>
-            <a:spLocks noGrp="1"/>
-          </p:cNvSpPr>
-          <p:nvPr>
-            <p:ph type="body" idx="1"/>
-          </p:nvPr>
-        </p:nvSpPr>
-        <p:spPr/>
-        <p:txBody>
-          <a:bodyPr/>
-          <a:lstStyle/>
-          <a:p>
-            <a:endParaRPr lang="en-US" dirty="0"/>
-          </a:p>
-        </p:txBody>
-      </p:sp>
-      <p:sp>
-        <p:nvSpPr>
-          <p:cNvPr id="4" name="Slide Number Placeholder 3"/>
-          <p:cNvSpPr>
-            <a:spLocks noGrp="1"/>
-          </p:cNvSpPr>
-          <p:nvPr>
-            <p:ph type="sldNum" sz="quarter" idx="5"/>
-          </p:nvPr>
-        </p:nvSpPr>
-        <p:spPr/>
-        <p:txBody>
-          <a:bodyPr/>
-          <a:lstStyle/>
-          <a:p>
-            <a:fld id="{D7987926-5BFB-47C7-ABC2-F42E69AD2A0E}" type="slidenum">
-              <a:rPr lang="de-DE" smtClean="0"/>
-              <a:pPr/>
-              <a:t>6</a:t>
-            </a:fld>
-            <a:endParaRPr lang="de-DE"/>
-          </a:p>
-        </p:txBody>
-      </p:sp>
-    </p:spTree>
-    <p:extLst>
-      <p:ext uri="{BB962C8B-B14F-4D97-AF65-F5344CB8AC3E}">
         <p14:creationId xmlns:p14="http://schemas.microsoft.com/office/powerpoint/2010/main" val="3821444783"/>
       </p:ext>
     </p:extLst>
@@ -9264,7 +9177,7 @@
             <a:fld id="{0014FB7C-1D85-4F32-B1E7-F7035F9F6211}" type="datetime1">
               <a:rPr lang="de-DE" smtClean="0"/>
               <a:pPr/>
-              <a:t>03.02.2020</a:t>
+              <a:t>04.02.2020</a:t>
             </a:fld>
             <a:endParaRPr lang="de-DE" dirty="0"/>
           </a:p>
@@ -9442,7 +9355,7 @@
             <a:fld id="{70D9B511-BCAA-4F77-AE2A-8B0A1FCBAA7B}" type="datetime1">
               <a:rPr lang="de-DE" smtClean="0"/>
               <a:pPr/>
-              <a:t>03.02.2020</a:t>
+              <a:t>04.02.2020</a:t>
             </a:fld>
             <a:endParaRPr lang="de-DE"/>
           </a:p>
@@ -9620,7 +9533,7 @@
             <a:fld id="{75E502DE-943F-427D-A876-BF3AAE2DA914}" type="datetime1">
               <a:rPr lang="de-DE" smtClean="0"/>
               <a:pPr/>
-              <a:t>03.02.2020</a:t>
+              <a:t>04.02.2020</a:t>
             </a:fld>
             <a:endParaRPr lang="de-DE"/>
           </a:p>
@@ -10370,7 +10283,7 @@
             <a:fld id="{E07B7684-A612-4C51-9709-FC85FE075249}" type="datetime1">
               <a:rPr lang="de-DE" smtClean="0"/>
               <a:pPr/>
-              <a:t>03.02.2020</a:t>
+              <a:t>04.02.2020</a:t>
             </a:fld>
             <a:endParaRPr lang="de-DE"/>
           </a:p>
@@ -10793,7 +10706,7 @@
             <a:fld id="{E2275034-4830-40AD-A105-00172D47DC59}" type="datetime1">
               <a:rPr lang="de-DE" smtClean="0"/>
               <a:pPr/>
-              <a:t>03.02.2020</a:t>
+              <a:t>04.02.2020</a:t>
             </a:fld>
             <a:endParaRPr lang="de-DE"/>
           </a:p>
@@ -10918,7 +10831,7 @@
             <a:fld id="{8760B306-308F-4820-932B-B4BF014A4D76}" type="datetime1">
               <a:rPr lang="de-DE" smtClean="0"/>
               <a:pPr/>
-              <a:t>03.02.2020</a:t>
+              <a:t>04.02.2020</a:t>
             </a:fld>
             <a:endParaRPr lang="de-DE"/>
           </a:p>
@@ -11013,7 +10926,7 @@
             <a:fld id="{787D21BE-467D-47F4-934A-DF64916F1551}" type="datetime1">
               <a:rPr lang="de-DE" smtClean="0"/>
               <a:pPr/>
-              <a:t>03.02.2020</a:t>
+              <a:t>04.02.2020</a:t>
             </a:fld>
             <a:endParaRPr lang="de-DE"/>
           </a:p>
@@ -11288,7 +11201,7 @@
             <a:fld id="{D7201360-EC73-4866-9BFE-F4AB28C20094}" type="datetime1">
               <a:rPr lang="de-DE" smtClean="0"/>
               <a:pPr/>
-              <a:t>03.02.2020</a:t>
+              <a:t>04.02.2020</a:t>
             </a:fld>
             <a:endParaRPr lang="de-DE"/>
           </a:p>
@@ -11540,7 +11453,7 @@
             <a:fld id="{ABC57659-5FEF-4BC2-86B5-7FBAC1251C05}" type="datetime1">
               <a:rPr lang="de-DE" smtClean="0"/>
               <a:pPr/>
-              <a:t>03.02.2020</a:t>
+              <a:t>04.02.2020</a:t>
             </a:fld>
             <a:endParaRPr lang="de-DE"/>
           </a:p>
@@ -11751,7 +11664,7 @@
             <a:fld id="{58BB00C1-4F3A-4412-AFC4-AE1502012676}" type="datetime1">
               <a:rPr lang="de-DE" smtClean="0"/>
               <a:pPr/>
-              <a:t>03.02.2020</a:t>
+              <a:t>04.02.2020</a:t>
             </a:fld>
             <a:endParaRPr lang="de-DE"/>
           </a:p>
@@ -12809,130 +12722,50 @@
           <a:p>
             <a:r>
               <a:rPr lang="en-US"/>
-              <a:t>Game</a:t>
+              <a:t>Results</a:t>
             </a:r>
             <a:endParaRPr lang="en-US" dirty="0"/>
           </a:p>
         </p:txBody>
       </p:sp>
-      <p:sp>
-        <p:nvSpPr>
-          <p:cNvPr id="4" name="Content Placeholder 3">
+      <p:pic>
+        <p:nvPicPr>
+          <p:cNvPr id="10" name="Content Placeholder 9">
             <a:extLst>
               <a:ext uri="{FF2B5EF4-FFF2-40B4-BE49-F238E27FC236}">
-                <a16:creationId xmlns:a16="http://schemas.microsoft.com/office/drawing/2014/main" id="{0F0C7689-BA8B-46E3-A631-2773D043692E}"/>
+                <a16:creationId xmlns:a16="http://schemas.microsoft.com/office/drawing/2014/main" id="{C122891F-835E-4BB4-9615-D9CD700056F2}"/>
               </a:ext>
             </a:extLst>
           </p:cNvPr>
-          <p:cNvSpPr>
-            <a:spLocks noGrp="1"/>
-          </p:cNvSpPr>
+          <p:cNvPicPr>
+            <a:picLocks noGrp="1" noChangeAspect="1"/>
+          </p:cNvPicPr>
           <p:nvPr>
             <p:ph idx="1"/>
           </p:nvPr>
-        </p:nvSpPr>
-        <p:spPr/>
-        <p:txBody>
-          <a:bodyPr/>
-          <a:lstStyle/>
-          <a:p>
-            <a:r>
-              <a:rPr lang="en-US"/>
-              <a:t>&lt;SCREENSHOT&gt;</a:t>
-            </a:r>
-            <a:endParaRPr lang="de-DE"/>
-          </a:p>
-        </p:txBody>
-      </p:sp>
-    </p:spTree>
-    <p:extLst>
-      <p:ext uri="{BB962C8B-B14F-4D97-AF65-F5344CB8AC3E}">
-        <p14:creationId xmlns:p14="http://schemas.microsoft.com/office/powerpoint/2010/main" val="1842053967"/>
-      </p:ext>
-    </p:extLst>
-  </p:cSld>
-  <p:clrMapOvr>
-    <a:masterClrMapping/>
-  </p:clrMapOvr>
-</p:sld>
-</file>
-
-<file path=ppt/slides/slide6.xml><?xml version="1.0" encoding="utf-8"?>
-<p:sld xmlns:a="http://schemas.openxmlformats.org/drawingml/2006/main" xmlns:r="http://schemas.openxmlformats.org/officeDocument/2006/relationships" xmlns:p="http://schemas.openxmlformats.org/presentationml/2006/main">
-  <p:cSld>
-    <p:spTree>
-      <p:nvGrpSpPr>
-        <p:cNvPr id="1" name=""/>
-        <p:cNvGrpSpPr/>
-        <p:nvPr/>
-      </p:nvGrpSpPr>
-      <p:grpSpPr>
-        <a:xfrm>
-          <a:off x="0" y="0"/>
-          <a:ext cx="0" cy="0"/>
-          <a:chOff x="0" y="0"/>
-          <a:chExt cx="0" cy="0"/>
-        </a:xfrm>
-      </p:grpSpPr>
-      <p:sp>
-        <p:nvSpPr>
-          <p:cNvPr id="3" name="Title 2">
+        </p:nvPicPr>
+        <p:blipFill>
+          <a:blip r:embed="rId3" cstate="print">
             <a:extLst>
-              <a:ext uri="{FF2B5EF4-FFF2-40B4-BE49-F238E27FC236}">
-                <a16:creationId xmlns:a16="http://schemas.microsoft.com/office/drawing/2014/main" id="{C8952BAA-CA4B-4A02-A92A-54A71493FBE7}"/>
+              <a:ext uri="{28A0092B-C50C-407E-A947-70E740481C1C}">
+                <a14:useLocalDpi xmlns:a14="http://schemas.microsoft.com/office/drawing/2010/main" val="0"/>
               </a:ext>
             </a:extLst>
-          </p:cNvPr>
-          <p:cNvSpPr>
-            <a:spLocks noGrp="1"/>
-          </p:cNvSpPr>
-          <p:nvPr>
-            <p:ph type="title"/>
-          </p:nvPr>
-        </p:nvSpPr>
-        <p:spPr/>
-        <p:txBody>
-          <a:bodyPr/>
-          <a:lstStyle/>
-          <a:p>
-            <a:r>
-              <a:rPr lang="en-US"/>
-              <a:t>Results</a:t>
-            </a:r>
-            <a:endParaRPr lang="en-US" dirty="0"/>
-          </a:p>
-        </p:txBody>
-      </p:sp>
-      <p:sp>
-        <p:nvSpPr>
-          <p:cNvPr id="4" name="Content Placeholder 3">
-            <a:extLst>
-              <a:ext uri="{FF2B5EF4-FFF2-40B4-BE49-F238E27FC236}">
-                <a16:creationId xmlns:a16="http://schemas.microsoft.com/office/drawing/2014/main" id="{447486BB-E702-4B37-B576-4556B4AF7898}"/>
-              </a:ext>
-            </a:extLst>
-          </p:cNvPr>
-          <p:cNvSpPr>
-            <a:spLocks noGrp="1"/>
-          </p:cNvSpPr>
-          <p:nvPr>
-            <p:ph idx="1"/>
-          </p:nvPr>
-        </p:nvSpPr>
-        <p:spPr/>
-        <p:txBody>
-          <a:bodyPr anchor="ctr">
-            <a:normAutofit/>
-          </a:bodyPr>
-          <a:lstStyle/>
-          <a:p>
-            <a:pPr marL="0" indent="0">
-              <a:buNone/>
-            </a:pPr>
-            <a:endParaRPr lang="en-US" sz="3600" dirty="0"/>
-          </a:p>
-        </p:txBody>
-      </p:sp>
+          </a:blip>
+          <a:stretch>
+            <a:fillRect/>
+          </a:stretch>
+        </p:blipFill>
+        <p:spPr>
+          <a:xfrm>
+            <a:off x="602754" y="1628800"/>
+            <a:ext cx="7938491" cy="4410273"/>
+          </a:xfrm>
+          <a:ln>
+            <a:noFill/>
+          </a:ln>
+        </p:spPr>
+      </p:pic>
     </p:spTree>
     <p:extLst>
       <p:ext uri="{BB962C8B-B14F-4D97-AF65-F5344CB8AC3E}">

</xml_diff>